<commit_message>
Correzioni schemi power point
</commit_message>
<xml_diff>
--- a/ISSPowerPoint.pptx
+++ b/ISSPowerPoint.pptx
@@ -267,7 +267,7 @@
           <a:p>
             <a:fld id="{E6413443-42B5-4B96-B751-851C9FA71E6D}" type="datetimeFigureOut">
               <a:rPr lang="it-IT" smtClean="0"/>
-              <a:t>13/07/2018</a:t>
+              <a:t>15/07/2018</a:t>
             </a:fld>
             <a:endParaRPr lang="it-IT"/>
           </a:p>
@@ -465,7 +465,7 @@
           <a:p>
             <a:fld id="{E6413443-42B5-4B96-B751-851C9FA71E6D}" type="datetimeFigureOut">
               <a:rPr lang="it-IT" smtClean="0"/>
-              <a:t>13/07/2018</a:t>
+              <a:t>15/07/2018</a:t>
             </a:fld>
             <a:endParaRPr lang="it-IT"/>
           </a:p>
@@ -673,7 +673,7 @@
           <a:p>
             <a:fld id="{E6413443-42B5-4B96-B751-851C9FA71E6D}" type="datetimeFigureOut">
               <a:rPr lang="it-IT" smtClean="0"/>
-              <a:t>13/07/2018</a:t>
+              <a:t>15/07/2018</a:t>
             </a:fld>
             <a:endParaRPr lang="it-IT"/>
           </a:p>
@@ -871,7 +871,7 @@
           <a:p>
             <a:fld id="{E6413443-42B5-4B96-B751-851C9FA71E6D}" type="datetimeFigureOut">
               <a:rPr lang="it-IT" smtClean="0"/>
-              <a:t>13/07/2018</a:t>
+              <a:t>15/07/2018</a:t>
             </a:fld>
             <a:endParaRPr lang="it-IT"/>
           </a:p>
@@ -1146,7 +1146,7 @@
           <a:p>
             <a:fld id="{E6413443-42B5-4B96-B751-851C9FA71E6D}" type="datetimeFigureOut">
               <a:rPr lang="it-IT" smtClean="0"/>
-              <a:t>13/07/2018</a:t>
+              <a:t>15/07/2018</a:t>
             </a:fld>
             <a:endParaRPr lang="it-IT"/>
           </a:p>
@@ -1411,7 +1411,7 @@
           <a:p>
             <a:fld id="{E6413443-42B5-4B96-B751-851C9FA71E6D}" type="datetimeFigureOut">
               <a:rPr lang="it-IT" smtClean="0"/>
-              <a:t>13/07/2018</a:t>
+              <a:t>15/07/2018</a:t>
             </a:fld>
             <a:endParaRPr lang="it-IT"/>
           </a:p>
@@ -1823,7 +1823,7 @@
           <a:p>
             <a:fld id="{E6413443-42B5-4B96-B751-851C9FA71E6D}" type="datetimeFigureOut">
               <a:rPr lang="it-IT" smtClean="0"/>
-              <a:t>13/07/2018</a:t>
+              <a:t>15/07/2018</a:t>
             </a:fld>
             <a:endParaRPr lang="it-IT"/>
           </a:p>
@@ -1964,7 +1964,7 @@
           <a:p>
             <a:fld id="{E6413443-42B5-4B96-B751-851C9FA71E6D}" type="datetimeFigureOut">
               <a:rPr lang="it-IT" smtClean="0"/>
-              <a:t>13/07/2018</a:t>
+              <a:t>15/07/2018</a:t>
             </a:fld>
             <a:endParaRPr lang="it-IT"/>
           </a:p>
@@ -2077,7 +2077,7 @@
           <a:p>
             <a:fld id="{E6413443-42B5-4B96-B751-851C9FA71E6D}" type="datetimeFigureOut">
               <a:rPr lang="it-IT" smtClean="0"/>
-              <a:t>13/07/2018</a:t>
+              <a:t>15/07/2018</a:t>
             </a:fld>
             <a:endParaRPr lang="it-IT"/>
           </a:p>
@@ -2388,7 +2388,7 @@
           <a:p>
             <a:fld id="{E6413443-42B5-4B96-B751-851C9FA71E6D}" type="datetimeFigureOut">
               <a:rPr lang="it-IT" smtClean="0"/>
-              <a:t>13/07/2018</a:t>
+              <a:t>15/07/2018</a:t>
             </a:fld>
             <a:endParaRPr lang="it-IT"/>
           </a:p>
@@ -2676,7 +2676,7 @@
           <a:p>
             <a:fld id="{E6413443-42B5-4B96-B751-851C9FA71E6D}" type="datetimeFigureOut">
               <a:rPr lang="it-IT" smtClean="0"/>
-              <a:t>13/07/2018</a:t>
+              <a:t>15/07/2018</a:t>
             </a:fld>
             <a:endParaRPr lang="it-IT"/>
           </a:p>
@@ -2917,7 +2917,7 @@
           <a:p>
             <a:fld id="{E6413443-42B5-4B96-B751-851C9FA71E6D}" type="datetimeFigureOut">
               <a:rPr lang="it-IT" smtClean="0"/>
-              <a:t>13/07/2018</a:t>
+              <a:t>15/07/2018</a:t>
             </a:fld>
             <a:endParaRPr lang="it-IT"/>
           </a:p>
@@ -19046,8 +19046,8 @@
         </p:nvSpPr>
         <p:spPr>
           <a:xfrm>
-            <a:off x="8406228" y="2988367"/>
-            <a:ext cx="2327410" cy="657881"/>
+            <a:off x="7913656" y="2988367"/>
+            <a:ext cx="2819982" cy="657881"/>
           </a:xfrm>
           <a:prstGeom prst="ellipse">
             <a:avLst/>
@@ -19111,7 +19111,7 @@
         <p:spPr>
           <a:xfrm>
             <a:off x="7199643" y="5592521"/>
-            <a:ext cx="1834255" cy="657881"/>
+            <a:ext cx="2499735" cy="657881"/>
           </a:xfrm>
           <a:prstGeom prst="ellipse">
             <a:avLst/>
@@ -19239,9 +19239,9 @@
         <p:grpSpPr>
           <a:xfrm>
             <a:off x="3895707" y="707171"/>
-            <a:ext cx="1751146" cy="373428"/>
+            <a:ext cx="1513754" cy="373428"/>
             <a:chOff x="3258796" y="818863"/>
-            <a:chExt cx="1751146" cy="373428"/>
+            <a:chExt cx="1513754" cy="373428"/>
           </a:xfrm>
         </p:grpSpPr>
         <p:cxnSp>
@@ -19263,7 +19263,7 @@
           <p:spPr>
             <a:xfrm flipV="1">
               <a:off x="3258796" y="1188195"/>
-              <a:ext cx="1751146" cy="4096"/>
+              <a:ext cx="1513754" cy="4096"/>
             </a:xfrm>
             <a:prstGeom prst="straightConnector1">
               <a:avLst/>
@@ -19386,10 +19386,10 @@
         </p:nvGrpSpPr>
         <p:grpSpPr>
           <a:xfrm>
-            <a:off x="8154331" y="3646248"/>
-            <a:ext cx="1453162" cy="1946273"/>
-            <a:chOff x="3027838" y="1547614"/>
-            <a:chExt cx="1453162" cy="1946273"/>
+            <a:off x="8449511" y="3646248"/>
+            <a:ext cx="874136" cy="1946273"/>
+            <a:chOff x="3323018" y="1547614"/>
+            <a:chExt cx="874136" cy="1946273"/>
           </a:xfrm>
         </p:grpSpPr>
         <p:cxnSp>
@@ -19410,8 +19410,8 @@
           </p:nvCxnSpPr>
           <p:spPr>
             <a:xfrm flipH="1">
-              <a:off x="3027838" y="1547614"/>
-              <a:ext cx="1453162" cy="1946273"/>
+              <a:off x="3323018" y="1547614"/>
+              <a:ext cx="874136" cy="1946273"/>
             </a:xfrm>
             <a:prstGeom prst="straightConnector1">
               <a:avLst/>
@@ -19451,7 +19451,7 @@
             <p:nvPr/>
           </p:nvSpPr>
           <p:spPr>
-            <a:xfrm rot="18317204">
+            <a:xfrm rot="17712826">
               <a:off x="2923906" y="2140573"/>
               <a:ext cx="1434711" cy="369332"/>
             </a:xfrm>
@@ -19488,10 +19488,10 @@
         </p:nvGrpSpPr>
         <p:grpSpPr>
           <a:xfrm>
-            <a:off x="7023210" y="1309099"/>
-            <a:ext cx="2546723" cy="1679268"/>
-            <a:chOff x="3196637" y="2246588"/>
-            <a:chExt cx="2546723" cy="1679268"/>
+            <a:off x="6785818" y="1309099"/>
+            <a:ext cx="2537829" cy="1679268"/>
+            <a:chOff x="2959245" y="2246588"/>
+            <a:chExt cx="2537829" cy="1679268"/>
           </a:xfrm>
         </p:grpSpPr>
         <p:cxnSp>
@@ -19512,8 +19512,8 @@
           </p:nvCxnSpPr>
           <p:spPr>
             <a:xfrm>
-              <a:off x="3196637" y="2246588"/>
-              <a:ext cx="2546723" cy="1679268"/>
+              <a:off x="2959245" y="2246588"/>
+              <a:ext cx="2537829" cy="1679268"/>
             </a:xfrm>
             <a:prstGeom prst="straightConnector1">
               <a:avLst/>
@@ -19554,7 +19554,7 @@
           </p:nvSpPr>
           <p:spPr>
             <a:xfrm rot="2020584">
-              <a:off x="3313127" y="2851735"/>
+              <a:off x="3133857" y="2852587"/>
               <a:ext cx="1513694" cy="369332"/>
             </a:xfrm>
             <a:prstGeom prst="rect">
@@ -19597,10 +19597,10 @@
         </p:nvGrpSpPr>
         <p:grpSpPr>
           <a:xfrm>
-            <a:off x="3604283" y="3315871"/>
-            <a:ext cx="2848821" cy="697436"/>
-            <a:chOff x="3455341" y="3268886"/>
-            <a:chExt cx="2848821" cy="697436"/>
+            <a:off x="3392552" y="3315871"/>
+            <a:ext cx="2848821" cy="723822"/>
+            <a:chOff x="3243610" y="3268886"/>
+            <a:chExt cx="2848821" cy="723822"/>
           </a:xfrm>
         </p:grpSpPr>
         <p:cxnSp>
@@ -19622,7 +19622,7 @@
           <p:spPr>
             <a:xfrm flipV="1">
               <a:off x="4083399" y="3268886"/>
-              <a:ext cx="1683517" cy="1"/>
+              <a:ext cx="1437334" cy="1"/>
             </a:xfrm>
             <a:prstGeom prst="straightConnector1">
               <a:avLst/>
@@ -19663,7 +19663,7 @@
           </p:nvSpPr>
           <p:spPr>
             <a:xfrm>
-              <a:off x="3455341" y="3596990"/>
+              <a:off x="3243610" y="3623376"/>
               <a:ext cx="2848821" cy="369332"/>
             </a:xfrm>
             <a:prstGeom prst="rect">
@@ -19912,7 +19912,7 @@
         </p:nvSpPr>
         <p:spPr>
           <a:xfrm>
-            <a:off x="5915858" y="2920988"/>
+            <a:off x="5669675" y="2920988"/>
             <a:ext cx="896706" cy="789765"/>
           </a:xfrm>
           <a:prstGeom prst="ellipse">
@@ -19977,9 +19977,9 @@
         <p:grpSpPr>
           <a:xfrm>
             <a:off x="2839763" y="1309099"/>
-            <a:ext cx="3043235" cy="1677832"/>
+            <a:ext cx="2805843" cy="1677832"/>
             <a:chOff x="5177715" y="1175120"/>
-            <a:chExt cx="3043235" cy="1677832"/>
+            <a:chExt cx="2805843" cy="1677832"/>
           </a:xfrm>
         </p:grpSpPr>
         <p:cxnSp>
@@ -20001,7 +20001,7 @@
           <p:spPr>
             <a:xfrm flipV="1">
               <a:off x="5177715" y="1175120"/>
-              <a:ext cx="3043235" cy="1677832"/>
+              <a:ext cx="2805843" cy="1677832"/>
             </a:xfrm>
             <a:prstGeom prst="straightConnector1">
               <a:avLst/>
@@ -20085,7 +20085,7 @@
         </p:nvSpPr>
         <p:spPr>
           <a:xfrm>
-            <a:off x="5646853" y="747562"/>
+            <a:off x="5409461" y="747562"/>
             <a:ext cx="1612502" cy="657881"/>
           </a:xfrm>
           <a:prstGeom prst="ellipse">
@@ -20165,6 +20165,105 @@
           <a:chExt cx="0" cy="0"/>
         </a:xfrm>
       </p:grpSpPr>
+      <p:pic>
+        <p:nvPicPr>
+          <p:cNvPr id="24" name="Immagine 23">
+            <a:extLst>
+              <a:ext uri="{FF2B5EF4-FFF2-40B4-BE49-F238E27FC236}">
+                <a16:creationId xmlns:a16="http://schemas.microsoft.com/office/drawing/2014/main" id="{3FD416C3-0F68-4653-B739-7A1566B8D7A8}"/>
+              </a:ext>
+            </a:extLst>
+          </p:cNvPr>
+          <p:cNvPicPr>
+            <a:picLocks noChangeAspect="1"/>
+          </p:cNvPicPr>
+          <p:nvPr/>
+        </p:nvPicPr>
+        <p:blipFill>
+          <a:blip r:embed="rId2"/>
+          <a:stretch>
+            <a:fillRect/>
+          </a:stretch>
+        </p:blipFill>
+        <p:spPr>
+          <a:xfrm>
+            <a:off x="4004557" y="3761418"/>
+            <a:ext cx="1106142" cy="1007964"/>
+          </a:xfrm>
+          <a:prstGeom prst="rect">
+            <a:avLst/>
+          </a:prstGeom>
+          <a:effectLst>
+            <a:softEdge rad="165100"/>
+          </a:effectLst>
+        </p:spPr>
+      </p:pic>
+      <p:pic>
+        <p:nvPicPr>
+          <p:cNvPr id="5" name="Immagine 4">
+            <a:extLst>
+              <a:ext uri="{FF2B5EF4-FFF2-40B4-BE49-F238E27FC236}">
+                <a16:creationId xmlns:a16="http://schemas.microsoft.com/office/drawing/2014/main" id="{D7FB9DFF-A647-45FB-849B-6999618B210C}"/>
+              </a:ext>
+            </a:extLst>
+          </p:cNvPr>
+          <p:cNvPicPr>
+            <a:picLocks noChangeAspect="1"/>
+          </p:cNvPicPr>
+          <p:nvPr/>
+        </p:nvPicPr>
+        <p:blipFill>
+          <a:blip r:embed="rId3"/>
+          <a:stretch>
+            <a:fillRect/>
+          </a:stretch>
+        </p:blipFill>
+        <p:spPr>
+          <a:xfrm>
+            <a:off x="6180488" y="3861348"/>
+            <a:ext cx="1151018" cy="957026"/>
+          </a:xfrm>
+          <a:prstGeom prst="rect">
+            <a:avLst/>
+          </a:prstGeom>
+          <a:effectLst>
+            <a:softEdge rad="177800"/>
+          </a:effectLst>
+        </p:spPr>
+      </p:pic>
+      <p:pic>
+        <p:nvPicPr>
+          <p:cNvPr id="6" name="Immagine 5">
+            <a:extLst>
+              <a:ext uri="{FF2B5EF4-FFF2-40B4-BE49-F238E27FC236}">
+                <a16:creationId xmlns:a16="http://schemas.microsoft.com/office/drawing/2014/main" id="{039F6009-BD0B-433B-AB42-79DF1AF06938}"/>
+              </a:ext>
+            </a:extLst>
+          </p:cNvPr>
+          <p:cNvPicPr>
+            <a:picLocks noChangeAspect="1"/>
+          </p:cNvPicPr>
+          <p:nvPr/>
+        </p:nvPicPr>
+        <p:blipFill>
+          <a:blip r:embed="rId2"/>
+          <a:stretch>
+            <a:fillRect/>
+          </a:stretch>
+        </p:blipFill>
+        <p:spPr>
+          <a:xfrm>
+            <a:off x="6225364" y="2129567"/>
+            <a:ext cx="1106142" cy="1007964"/>
+          </a:xfrm>
+          <a:prstGeom prst="rect">
+            <a:avLst/>
+          </a:prstGeom>
+          <a:effectLst>
+            <a:softEdge rad="165100"/>
+          </a:effectLst>
+        </p:spPr>
+      </p:pic>
       <p:sp>
         <p:nvSpPr>
           <p:cNvPr id="4" name="Ovale 3">
@@ -20243,7 +20342,7 @@
         </p:nvSpPr>
         <p:spPr>
           <a:xfrm>
-            <a:off x="5729519" y="1562359"/>
+            <a:off x="6556289" y="1562359"/>
             <a:ext cx="1464466" cy="657881"/>
           </a:xfrm>
           <a:prstGeom prst="ellipse">
@@ -20307,7 +20406,7 @@
         </p:nvSpPr>
         <p:spPr>
           <a:xfrm>
-            <a:off x="5602992" y="3559362"/>
+            <a:off x="6429762" y="4654737"/>
             <a:ext cx="1717520" cy="657881"/>
           </a:xfrm>
           <a:prstGeom prst="ellipse">
@@ -20421,8 +20520,8 @@
         </p:nvCxnSpPr>
         <p:spPr>
           <a:xfrm flipH="1">
-            <a:off x="4830111" y="3888303"/>
-            <a:ext cx="772881" cy="1"/>
+            <a:off x="4830111" y="4983678"/>
+            <a:ext cx="1599651" cy="1"/>
           </a:xfrm>
           <a:prstGeom prst="straightConnector1">
             <a:avLst/>
@@ -20467,8 +20566,8 @@
         </p:nvCxnSpPr>
         <p:spPr>
           <a:xfrm>
-            <a:off x="6461752" y="2220240"/>
-            <a:ext cx="0" cy="1339122"/>
+            <a:off x="7288522" y="2220240"/>
+            <a:ext cx="0" cy="2434497"/>
           </a:xfrm>
           <a:prstGeom prst="straightConnector1">
             <a:avLst/>
@@ -20514,7 +20613,7 @@
         <p:spPr>
           <a:xfrm flipV="1">
             <a:off x="4753293" y="1891300"/>
-            <a:ext cx="976226" cy="14064"/>
+            <a:ext cx="1802996" cy="14064"/>
           </a:xfrm>
           <a:prstGeom prst="straightConnector1">
             <a:avLst/>
@@ -20555,7 +20654,7 @@
         </p:nvSpPr>
         <p:spPr>
           <a:xfrm>
-            <a:off x="3175217" y="3559363"/>
+            <a:off x="3175217" y="4654738"/>
             <a:ext cx="1654894" cy="657881"/>
           </a:xfrm>
           <a:prstGeom prst="ellipse">
@@ -20624,7 +20723,7 @@
         <p:spPr>
           <a:xfrm flipV="1">
             <a:off x="4002664" y="2234304"/>
-            <a:ext cx="0" cy="1325059"/>
+            <a:ext cx="0" cy="2420434"/>
           </a:xfrm>
           <a:prstGeom prst="straightConnector1">
             <a:avLst/>
@@ -20839,7 +20938,7 @@
         </p:nvSpPr>
         <p:spPr>
           <a:xfrm rot="10800000">
-            <a:off x="4420828" y="1418171"/>
+            <a:off x="4329965" y="1413576"/>
             <a:ext cx="448407" cy="447338"/>
           </a:xfrm>
           <a:prstGeom prst="upArrow">
@@ -20848,6 +20947,11 @@
           <a:solidFill>
             <a:srgbClr val="FFC000"/>
           </a:solidFill>
+          <a:ln>
+            <a:solidFill>
+              <a:schemeClr val="bg1"/>
+            </a:solidFill>
+          </a:ln>
         </p:spPr>
         <p:style>
           <a:lnRef idx="2">
@@ -20887,8 +20991,8 @@
           <p:nvPr/>
         </p:nvSpPr>
         <p:spPr>
-          <a:xfrm rot="16200000">
-            <a:off x="6819121" y="1905898"/>
+          <a:xfrm rot="5400000">
+            <a:off x="7645891" y="1905898"/>
             <a:ext cx="448407" cy="447338"/>
           </a:xfrm>
           <a:prstGeom prst="upArrow">
@@ -20897,6 +21001,11 @@
           <a:solidFill>
             <a:srgbClr val="FFC000"/>
           </a:solidFill>
+          <a:ln>
+            <a:solidFill>
+              <a:schemeClr val="bg1"/>
+            </a:solidFill>
+          </a:ln>
         </p:spPr>
         <p:style>
           <a:lnRef idx="2">
@@ -20937,7 +21046,7 @@
         </p:nvSpPr>
         <p:spPr>
           <a:xfrm>
-            <a:off x="6872105" y="3335693"/>
+            <a:off x="7722866" y="4564599"/>
             <a:ext cx="448407" cy="447338"/>
           </a:xfrm>
           <a:prstGeom prst="upArrow">
@@ -20946,6 +21055,11 @@
           <a:solidFill>
             <a:srgbClr val="FFC000"/>
           </a:solidFill>
+          <a:ln>
+            <a:solidFill>
+              <a:schemeClr val="bg1"/>
+            </a:solidFill>
+          </a:ln>
         </p:spPr>
         <p:style>
           <a:lnRef idx="2">
@@ -20986,7 +21100,7 @@
         </p:nvSpPr>
         <p:spPr>
           <a:xfrm rot="5400000">
-            <a:off x="4308554" y="3401438"/>
+            <a:off x="4313356" y="4540155"/>
             <a:ext cx="448407" cy="447338"/>
           </a:xfrm>
           <a:prstGeom prst="upArrow">
@@ -20995,6 +21109,11 @@
           <a:solidFill>
             <a:srgbClr val="FFC000"/>
           </a:solidFill>
+          <a:ln>
+            <a:solidFill>
+              <a:schemeClr val="bg1"/>
+            </a:solidFill>
+          </a:ln>
         </p:spPr>
         <p:style>
           <a:lnRef idx="2">
@@ -21021,6 +21140,39 @@
           </a:p>
         </p:txBody>
       </p:sp>
+      <p:pic>
+        <p:nvPicPr>
+          <p:cNvPr id="3" name="Immagine 2">
+            <a:extLst>
+              <a:ext uri="{FF2B5EF4-FFF2-40B4-BE49-F238E27FC236}">
+                <a16:creationId xmlns:a16="http://schemas.microsoft.com/office/drawing/2014/main" id="{A13A718A-E1CE-4875-963F-C98E933C6789}"/>
+              </a:ext>
+            </a:extLst>
+          </p:cNvPr>
+          <p:cNvPicPr>
+            <a:picLocks noChangeAspect="1"/>
+          </p:cNvPicPr>
+          <p:nvPr/>
+        </p:nvPicPr>
+        <p:blipFill>
+          <a:blip r:embed="rId4"/>
+          <a:stretch>
+            <a:fillRect/>
+          </a:stretch>
+        </p:blipFill>
+        <p:spPr>
+          <a:xfrm>
+            <a:off x="4110799" y="2145405"/>
+            <a:ext cx="1170100" cy="1005760"/>
+          </a:xfrm>
+          <a:prstGeom prst="rect">
+            <a:avLst/>
+          </a:prstGeom>
+          <a:effectLst>
+            <a:softEdge rad="177800"/>
+          </a:effectLst>
+        </p:spPr>
+      </p:pic>
     </p:spTree>
     <p:extLst>
       <p:ext uri="{BB962C8B-B14F-4D97-AF65-F5344CB8AC3E}">

</xml_diff>